<commit_message>
Pre-lezione 5/5, anno 1
</commit_message>
<xml_diff>
--- a/Numpy.pptx
+++ b/Numpy.pptx
@@ -253,7 +253,7 @@
           <a:p>
             <a:fld id="{63A1C593-65D0-4073-BCC9-577B9352EA97}" type="datetimeFigureOut">
               <a:rPr lang="en-US" smtClean="0"/>
-              <a:t>3/16/2020</a:t>
+              <a:t>5/4/2020</a:t>
             </a:fld>
             <a:endParaRPr lang="en-US"/>
           </a:p>
@@ -423,7 +423,7 @@
           <a:p>
             <a:fld id="{63A1C593-65D0-4073-BCC9-577B9352EA97}" type="datetimeFigureOut">
               <a:rPr lang="en-US" smtClean="0"/>
-              <a:t>3/16/2020</a:t>
+              <a:t>5/4/2020</a:t>
             </a:fld>
             <a:endParaRPr lang="en-US"/>
           </a:p>
@@ -603,7 +603,7 @@
           <a:p>
             <a:fld id="{63A1C593-65D0-4073-BCC9-577B9352EA97}" type="datetimeFigureOut">
               <a:rPr lang="en-US" smtClean="0"/>
-              <a:t>3/16/2020</a:t>
+              <a:t>5/4/2020</a:t>
             </a:fld>
             <a:endParaRPr lang="en-US"/>
           </a:p>
@@ -773,7 +773,7 @@
           <a:p>
             <a:fld id="{63A1C593-65D0-4073-BCC9-577B9352EA97}" type="datetimeFigureOut">
               <a:rPr lang="en-US" smtClean="0"/>
-              <a:t>3/16/2020</a:t>
+              <a:t>5/4/2020</a:t>
             </a:fld>
             <a:endParaRPr lang="en-US"/>
           </a:p>
@@ -1019,7 +1019,7 @@
           <a:p>
             <a:fld id="{63A1C593-65D0-4073-BCC9-577B9352EA97}" type="datetimeFigureOut">
               <a:rPr lang="en-US" smtClean="0"/>
-              <a:t>3/16/2020</a:t>
+              <a:t>5/4/2020</a:t>
             </a:fld>
             <a:endParaRPr lang="en-US"/>
           </a:p>
@@ -1251,7 +1251,7 @@
           <a:p>
             <a:fld id="{63A1C593-65D0-4073-BCC9-577B9352EA97}" type="datetimeFigureOut">
               <a:rPr lang="en-US" smtClean="0"/>
-              <a:t>3/16/2020</a:t>
+              <a:t>5/4/2020</a:t>
             </a:fld>
             <a:endParaRPr lang="en-US"/>
           </a:p>
@@ -1618,7 +1618,7 @@
           <a:p>
             <a:fld id="{63A1C593-65D0-4073-BCC9-577B9352EA97}" type="datetimeFigureOut">
               <a:rPr lang="en-US" smtClean="0"/>
-              <a:t>3/16/2020</a:t>
+              <a:t>5/4/2020</a:t>
             </a:fld>
             <a:endParaRPr lang="en-US"/>
           </a:p>
@@ -1736,7 +1736,7 @@
           <a:p>
             <a:fld id="{63A1C593-65D0-4073-BCC9-577B9352EA97}" type="datetimeFigureOut">
               <a:rPr lang="en-US" smtClean="0"/>
-              <a:t>3/16/2020</a:t>
+              <a:t>5/4/2020</a:t>
             </a:fld>
             <a:endParaRPr lang="en-US"/>
           </a:p>
@@ -1831,7 +1831,7 @@
           <a:p>
             <a:fld id="{63A1C593-65D0-4073-BCC9-577B9352EA97}" type="datetimeFigureOut">
               <a:rPr lang="en-US" smtClean="0"/>
-              <a:t>3/16/2020</a:t>
+              <a:t>5/4/2020</a:t>
             </a:fld>
             <a:endParaRPr lang="en-US"/>
           </a:p>
@@ -2108,7 +2108,7 @@
           <a:p>
             <a:fld id="{63A1C593-65D0-4073-BCC9-577B9352EA97}" type="datetimeFigureOut">
               <a:rPr lang="en-US" smtClean="0"/>
-              <a:t>3/16/2020</a:t>
+              <a:t>5/4/2020</a:t>
             </a:fld>
             <a:endParaRPr lang="en-US"/>
           </a:p>
@@ -2361,7 +2361,7 @@
           <a:p>
             <a:fld id="{63A1C593-65D0-4073-BCC9-577B9352EA97}" type="datetimeFigureOut">
               <a:rPr lang="en-US" smtClean="0"/>
-              <a:t>3/16/2020</a:t>
+              <a:t>5/4/2020</a:t>
             </a:fld>
             <a:endParaRPr lang="en-US"/>
           </a:p>
@@ -2574,7 +2574,7 @@
           <a:p>
             <a:fld id="{63A1C593-65D0-4073-BCC9-577B9352EA97}" type="datetimeFigureOut">
               <a:rPr lang="en-US" smtClean="0"/>
-              <a:t>3/16/2020</a:t>
+              <a:t>5/4/2020</a:t>
             </a:fld>
             <a:endParaRPr lang="en-US"/>
           </a:p>
@@ -3183,7 +3183,11 @@
             </a:r>
             <a:r>
               <a:rPr lang="en-US" dirty="0" smtClean="0"/>
-              <a:t>(missing) dimensions </a:t>
+              <a:t>(missing) </a:t>
+            </a:r>
+            <a:r>
+              <a:rPr lang="en-US" dirty="0" smtClean="0"/>
+              <a:t>dimension(s) </a:t>
             </a:r>
             <a:r>
               <a:rPr lang="en-US" dirty="0"/>
@@ -3315,13 +3319,39 @@
         <p:spPr/>
         <p:txBody>
           <a:bodyPr>
-            <a:normAutofit fontScale="92500" lnSpcReduction="20000"/>
+            <a:normAutofit fontScale="85000" lnSpcReduction="20000"/>
           </a:bodyPr>
           <a:lstStyle/>
           <a:p>
             <a:r>
               <a:rPr lang="en-US" dirty="0"/>
-              <a:t>Simple assignments make no copy of objects or their data</a:t>
+              <a:t>Simple assignments make no copy of objects or </a:t>
+            </a:r>
+            <a:r>
+              <a:rPr lang="en-US"/>
+              <a:t>their </a:t>
+            </a:r>
+            <a:r>
+              <a:rPr lang="en-US" smtClean="0"/>
+              <a:t>data</a:t>
+            </a:r>
+          </a:p>
+          <a:p>
+            <a:pPr lvl="1"/>
+            <a:r>
+              <a:rPr lang="en-US" smtClean="0"/>
+              <a:t>(i.e</a:t>
+            </a:r>
+            <a:r>
+              <a:rPr lang="en-US" dirty="0" smtClean="0"/>
+              <a:t>. the underlying object is the same).</a:t>
+            </a:r>
+            <a:endParaRPr lang="en-US" dirty="0" smtClean="0"/>
+          </a:p>
+          <a:p>
+            <a:r>
+              <a:rPr lang="en-US" dirty="0"/>
+              <a:t>Python passes mutable objects as references, so function calls make no copy</a:t>
             </a:r>
             <a:r>
               <a:rPr lang="en-US" dirty="0" smtClean="0"/>
@@ -3331,7 +3361,14 @@
           <a:p>
             <a:r>
               <a:rPr lang="en-US" dirty="0"/>
-              <a:t>Python passes mutable objects as references, so function calls make no copy</a:t>
+              <a:t>View or Shallow Copy</a:t>
+            </a:r>
+          </a:p>
+          <a:p>
+            <a:pPr lvl="1"/>
+            <a:r>
+              <a:rPr lang="en-US" dirty="0"/>
+              <a:t>Different array objects can share the same data. The view method creates a new array object that looks at the same data</a:t>
             </a:r>
             <a:r>
               <a:rPr lang="en-US" dirty="0" smtClean="0"/>
@@ -3339,16 +3376,28 @@
             </a:r>
           </a:p>
           <a:p>
-            <a:r>
-              <a:rPr lang="en-US" dirty="0"/>
-              <a:t>View or Shallow Copy</a:t>
-            </a:r>
+            <a:pPr lvl="2"/>
+            <a:r>
+              <a:rPr lang="it-IT" dirty="0" smtClean="0"/>
+              <a:t>Different shapes are possible</a:t>
+            </a:r>
+            <a:endParaRPr lang="en-US" dirty="0" smtClean="0"/>
           </a:p>
           <a:p>
             <a:pPr lvl="1"/>
             <a:r>
               <a:rPr lang="en-US" dirty="0"/>
-              <a:t>Different array objects can share the same data. The view method creates a new array object that looks at the same data</a:t>
+              <a:t>Slicing an array returns a view of </a:t>
+            </a:r>
+            <a:r>
+              <a:rPr lang="en-US" dirty="0" smtClean="0"/>
+              <a:t>it</a:t>
+            </a:r>
+          </a:p>
+          <a:p>
+            <a:r>
+              <a:rPr lang="en-US" dirty="0"/>
+              <a:t>The copy method makes a complete copy of the array and its data</a:t>
             </a:r>
             <a:r>
               <a:rPr lang="en-US" dirty="0" smtClean="0"/>
@@ -3356,44 +3405,10 @@
             </a:r>
           </a:p>
           <a:p>
-            <a:pPr lvl="2"/>
-            <a:r>
-              <a:rPr lang="it-IT" dirty="0" smtClean="0"/>
-              <a:t>Different shapes are possible</a:t>
-            </a:r>
-            <a:endParaRPr lang="en-US" dirty="0" smtClean="0"/>
-          </a:p>
-          <a:p>
-            <a:pPr lvl="1"/>
-            <a:r>
-              <a:rPr lang="en-US" dirty="0"/>
-              <a:t>Slicing an array returns a view of </a:t>
-            </a:r>
-            <a:r>
-              <a:rPr lang="en-US" dirty="0" smtClean="0"/>
-              <a:t>it</a:t>
-            </a:r>
-          </a:p>
-          <a:p>
-            <a:r>
-              <a:rPr lang="en-US" dirty="0"/>
-              <a:t>The copy method makes a complete copy of the array and its data</a:t>
-            </a:r>
-            <a:r>
-              <a:rPr lang="en-US" dirty="0" smtClean="0"/>
-              <a:t>.</a:t>
-            </a:r>
-          </a:p>
-          <a:p>
-            <a:r>
-              <a:rPr lang="en-US" dirty="0"/>
-              <a:t>Sometimes copy should be called after slicing if the original array is not required anymore. </a:t>
-            </a:r>
-            <a:r>
-              <a:rPr lang="en-US"/>
-              <a:t>For example, suppose a is a huge intermediate result and the final result b only contains a small fraction of a, a deep copy should be made when constructing b with slicing:</a:t>
-            </a:r>
-            <a:endParaRPr lang="en-US" dirty="0"/>
+            <a:r>
+              <a:rPr lang="en-US" dirty="0"/>
+              <a:t>Sometimes copy should be called after slicing if the original array is not required anymore. For example, suppose a is a huge intermediate result and the final result b only contains a small fraction of a, a deep copy should be made when constructing b with slicing:</a:t>
+            </a:r>
           </a:p>
         </p:txBody>
       </p:sp>
@@ -3463,7 +3478,7 @@
         <p:spPr/>
         <p:txBody>
           <a:bodyPr>
-            <a:normAutofit fontScale="85000" lnSpcReduction="20000"/>
+            <a:normAutofit fontScale="85000" lnSpcReduction="10000"/>
           </a:bodyPr>
           <a:lstStyle/>
           <a:p>
@@ -3473,50 +3488,117 @@
             </a:r>
             <a:r>
               <a:rPr lang="en-US" dirty="0"/>
-              <a:t> main object is the homogeneous multidimensional array. It is a table of elements (usually numbers), all of the same type, indexed by a tuple of non-negative integers. In </a:t>
-            </a:r>
-            <a:r>
-              <a:rPr lang="en-US" dirty="0" err="1"/>
+              <a:t> main object is the </a:t>
+            </a:r>
+            <a:r>
+              <a:rPr lang="en-US" dirty="0" smtClean="0"/>
+              <a:t>homogeneous </a:t>
+            </a:r>
+            <a:r>
+              <a:rPr lang="en-US" b="1" dirty="0" smtClean="0"/>
+              <a:t>multidimensional array</a:t>
+            </a:r>
+            <a:r>
+              <a:rPr lang="en-US" dirty="0" smtClean="0"/>
+              <a:t>. </a:t>
+            </a:r>
+            <a:r>
+              <a:rPr lang="en-US" dirty="0"/>
+              <a:t>It is a table of elements (usually numbers), all of the same type, </a:t>
+            </a:r>
+            <a:r>
+              <a:rPr lang="en-US" b="1" dirty="0" smtClean="0"/>
+              <a:t>indexed </a:t>
+            </a:r>
+            <a:r>
+              <a:rPr lang="en-US" b="1" dirty="0"/>
+              <a:t>by a tuple </a:t>
+            </a:r>
+            <a:r>
+              <a:rPr lang="en-US" dirty="0"/>
+              <a:t>of non-negative integers. In </a:t>
+            </a:r>
+            <a:r>
+              <a:rPr lang="en-US" dirty="0" err="1">
+                <a:solidFill>
+                  <a:srgbClr val="FF0000"/>
+                </a:solidFill>
+              </a:rPr>
               <a:t>NumPy</a:t>
             </a:r>
             <a:r>
-              <a:rPr lang="en-US" dirty="0"/>
+              <a:rPr lang="en-US" dirty="0">
+                <a:solidFill>
+                  <a:srgbClr val="FF0000"/>
+                </a:solidFill>
+              </a:rPr>
               <a:t> dimensions are called </a:t>
             </a:r>
             <a:r>
-              <a:rPr lang="en-US" i="1" dirty="0"/>
-              <a:t>axes</a:t>
+              <a:rPr lang="en-US" i="1" dirty="0" smtClean="0">
+                <a:solidFill>
+                  <a:srgbClr val="FF0000"/>
+                </a:solidFill>
+              </a:rPr>
+              <a:t>axes (or dimensions)</a:t>
             </a:r>
             <a:r>
               <a:rPr lang="en-US" dirty="0" smtClean="0"/>
               <a:t>.</a:t>
             </a:r>
-          </a:p>
-          <a:p>
-            <a:r>
-              <a:rPr lang="en-US" dirty="0"/>
-              <a:t>For example, the coordinates of a point in 3D space [1, 2, 1] has one axis. That axis has 3 elements in it, so we say it has a length of 3. In the example pictured below, the array has 2 axes. The first axis has a length of 2, the second axis has a length of 3</a:t>
-            </a:r>
-            <a:r>
-              <a:rPr lang="en-US" dirty="0"/>
-              <a:t>.</a:t>
-            </a:r>
-            <a:endParaRPr lang="en-US" dirty="0"/>
+            <a:endParaRPr lang="en-US" dirty="0" smtClean="0"/>
+          </a:p>
+          <a:p>
+            <a:r>
+              <a:rPr lang="en-US" dirty="0"/>
+              <a:t>For example, </a:t>
+            </a:r>
+            <a:r>
+              <a:rPr lang="en-US" b="1" dirty="0"/>
+              <a:t>the coordinates of a point in 3D space [1, 2, 1] has one axis</a:t>
+            </a:r>
+            <a:r>
+              <a:rPr lang="en-US" dirty="0"/>
+              <a:t>. That axis has </a:t>
+            </a:r>
+            <a:r>
+              <a:rPr lang="en-US" b="1" dirty="0"/>
+              <a:t>3 elements in it</a:t>
+            </a:r>
+            <a:r>
+              <a:rPr lang="en-US" dirty="0"/>
+              <a:t>, so we say it has a length of </a:t>
+            </a:r>
+            <a:r>
+              <a:rPr lang="en-US" dirty="0" smtClean="0"/>
+              <a:t>3.</a:t>
+            </a:r>
           </a:p>
           <a:p>
             <a:pPr lvl="1"/>
             <a:r>
-              <a:rPr lang="en-US" sz="2800" dirty="0"/>
+              <a:rPr lang="en-US" dirty="0" smtClean="0"/>
+              <a:t>In </a:t>
+            </a:r>
+            <a:r>
+              <a:rPr lang="en-US" dirty="0"/>
+              <a:t>the example pictured below, the array has 2 axes. The first axis has a length of 2, the second axis has a length of 3.</a:t>
+            </a:r>
+          </a:p>
+          <a:p>
+            <a:pPr lvl="2"/>
+            <a:r>
+              <a:rPr lang="en-US" sz="2400" dirty="0"/>
               <a:t>[[ 1., 0., 0.],</a:t>
             </a:r>
           </a:p>
           <a:p>
-            <a:pPr lvl="1"/>
-            <a:r>
-              <a:rPr lang="en-US" sz="2800" dirty="0"/>
+            <a:pPr lvl="2"/>
+            <a:r>
+              <a:rPr lang="en-US" sz="2400" dirty="0"/>
               <a:t> [ 0., 1., 2.]]</a:t>
             </a:r>
-            <a:endParaRPr lang="en-US" sz="2800" dirty="0">
+            <a:endParaRPr lang="en-US" sz="2400" dirty="0">
               <a:hlinkClick r:id="rId2"/>
             </a:endParaRPr>
           </a:p>
@@ -3530,11 +3612,15 @@
               <a:t> </a:t>
             </a:r>
             <a:r>
-              <a:rPr lang="en-US" dirty="0"/>
-              <a:t>array class is called </a:t>
-            </a:r>
-            <a:r>
-              <a:rPr lang="en-US" dirty="0" err="1"/>
+              <a:rPr lang="en-US" b="1" dirty="0"/>
+              <a:t>array class </a:t>
+            </a:r>
+            <a:r>
+              <a:rPr lang="en-US" dirty="0"/>
+              <a:t>is called </a:t>
+            </a:r>
+            <a:r>
+              <a:rPr lang="en-US" b="1" dirty="0" err="1"/>
               <a:t>ndarray</a:t>
             </a:r>
             <a:r>
@@ -3547,11 +3633,7 @@
             </a:r>
             <a:r>
               <a:rPr lang="en-US" dirty="0"/>
-              <a:t>by the alias array. </a:t>
-            </a:r>
-            <a:r>
-              <a:rPr lang="en-US" dirty="0"/>
-              <a:t>Note that </a:t>
+              <a:t>by the alias array. Note that </a:t>
             </a:r>
             <a:r>
               <a:rPr lang="en-US" dirty="0" err="1"/>
@@ -3559,10 +3641,14 @@
             </a:r>
             <a:r>
               <a:rPr lang="en-US" dirty="0"/>
-              <a:t> is not the same as the Standard Python Library class </a:t>
-            </a:r>
-            <a:r>
-              <a:rPr lang="en-US" dirty="0" err="1"/>
+              <a:t> is </a:t>
+            </a:r>
+            <a:r>
+              <a:rPr lang="en-US" b="1" dirty="0"/>
+              <a:t>not the same as the Standard Python Library class </a:t>
+            </a:r>
+            <a:r>
+              <a:rPr lang="en-US" b="1" dirty="0" err="1"/>
               <a:t>array.array</a:t>
             </a:r>
             <a:r>
@@ -3575,9 +3661,6 @@
               </a:rPr>
               <a:t>.</a:t>
             </a:r>
-            <a:endParaRPr lang="en-US" dirty="0">
-              <a:hlinkClick r:id="rId2"/>
-            </a:endParaRPr>
           </a:p>
           <a:p>
             <a:r>
@@ -3672,7 +3755,7 @@
         <p:spPr/>
         <p:txBody>
           <a:bodyPr>
-            <a:normAutofit fontScale="92500" lnSpcReduction="10000"/>
+            <a:normAutofit fontScale="92500" lnSpcReduction="20000"/>
           </a:bodyPr>
           <a:lstStyle/>
           <a:p>
@@ -3691,6 +3774,18 @@
               <a:rPr lang="en-US" dirty="0" err="1" smtClean="0"/>
               <a:t>ndarray.ndim</a:t>
             </a:r>
+            <a:r>
+              <a:rPr lang="en-US" dirty="0" smtClean="0"/>
+              <a:t> (number of axes/</a:t>
+            </a:r>
+            <a:r>
+              <a:rPr lang="en-US" dirty="0" err="1" smtClean="0"/>
+              <a:t>dmensions</a:t>
+            </a:r>
+            <a:r>
+              <a:rPr lang="en-US" dirty="0" smtClean="0"/>
+              <a:t>)</a:t>
+            </a:r>
             <a:endParaRPr lang="en-US" dirty="0" smtClean="0"/>
           </a:p>
           <a:p>
@@ -3699,20 +3794,57 @@
               <a:rPr lang="en-US" dirty="0" err="1" smtClean="0"/>
               <a:t>ndarray.shape</a:t>
             </a:r>
+            <a:r>
+              <a:rPr lang="en-US" dirty="0" smtClean="0"/>
+              <a:t> (size of the array in each dimension/axis)</a:t>
+            </a:r>
             <a:endParaRPr lang="en-US" dirty="0" smtClean="0"/>
           </a:p>
           <a:p>
             <a:pPr lvl="1"/>
             <a:r>
+              <a:rPr lang="en-US" dirty="0" err="1" smtClean="0"/>
+              <a:t>ndarray.size</a:t>
+            </a:r>
+            <a:endParaRPr lang="it-IT" dirty="0" smtClean="0"/>
+          </a:p>
+          <a:p>
+            <a:pPr lvl="1"/>
+            <a:r>
+              <a:rPr lang="en-US" dirty="0" err="1" smtClean="0"/>
+              <a:t>ndarray.dtype</a:t>
+            </a:r>
+            <a:r>
+              <a:rPr lang="en-US" dirty="0" smtClean="0"/>
+              <a:t> (type of the elements)</a:t>
+            </a:r>
+            <a:endParaRPr lang="it-IT" dirty="0" smtClean="0"/>
+          </a:p>
+          <a:p>
+            <a:pPr lvl="1"/>
+            <a:r>
               <a:rPr lang="it-IT" dirty="0" smtClean="0"/>
-              <a:t>Etc.</a:t>
-            </a:r>
-          </a:p>
-          <a:p>
+              <a:t>Etc</a:t>
+            </a:r>
             <a:r>
               <a:rPr lang="it-IT" dirty="0" smtClean="0"/>
-              <a:t>Array creation</a:t>
-            </a:r>
+              <a:t>.</a:t>
+            </a:r>
+          </a:p>
+          <a:p>
+            <a:r>
+              <a:rPr lang="it-IT" dirty="0" smtClean="0"/>
+              <a:t>Array </a:t>
+            </a:r>
+            <a:r>
+              <a:rPr lang="it-IT" dirty="0" smtClean="0"/>
+              <a:t>creation, </a:t>
+            </a:r>
+            <a:r>
+              <a:rPr lang="it-IT" i="1" dirty="0" smtClean="0"/>
+              <a:t>np.arange(10)</a:t>
+            </a:r>
+            <a:endParaRPr lang="it-IT" i="1" dirty="0" smtClean="0"/>
           </a:p>
           <a:p>
             <a:r>
@@ -3856,7 +3988,15 @@
           <a:p>
             <a:r>
               <a:rPr lang="en-US" dirty="0"/>
-              <a:t>By default, these operations apply to the array as though it were a list of numbers, regardless of its shape. However, by specifying the axis parameter you can apply an operation along the specified axis of an array:</a:t>
+              <a:t>By default, these </a:t>
+            </a:r>
+            <a:r>
+              <a:rPr lang="en-US" b="1" dirty="0"/>
+              <a:t>operations apply to the array as though it were a list of numbers</a:t>
+            </a:r>
+            <a:r>
+              <a:rPr lang="en-US" dirty="0"/>
+              <a:t>, regardless of its shape. However, by specifying the axis parameter you can apply an operation along the specified axis of an array:</a:t>
             </a:r>
           </a:p>
         </p:txBody>
@@ -4387,7 +4527,39 @@
             </a:r>
             <a:r>
               <a:rPr lang="en-US" dirty="0"/>
-              <a:t>, these functions operate elementwise on an array, producing an array as output.</a:t>
+              <a:t>, these functions operate elementwise on an </a:t>
+            </a:r>
+            <a:r>
+              <a:rPr lang="en-US" dirty="0" smtClean="0"/>
+              <a:t>array (</a:t>
+            </a:r>
+            <a:r>
+              <a:rPr lang="en-US" dirty="0" err="1" smtClean="0"/>
+              <a:t>multidim</a:t>
+            </a:r>
+            <a:r>
+              <a:rPr lang="en-US" dirty="0" smtClean="0"/>
+              <a:t>), </a:t>
+            </a:r>
+            <a:r>
+              <a:rPr lang="en-US" dirty="0"/>
+              <a:t>producing an array </a:t>
+            </a:r>
+            <a:r>
+              <a:rPr lang="en-US" dirty="0" smtClean="0"/>
+              <a:t>(</a:t>
+            </a:r>
+            <a:r>
+              <a:rPr lang="en-US" dirty="0" err="1" smtClean="0"/>
+              <a:t>multidim</a:t>
+            </a:r>
+            <a:r>
+              <a:rPr lang="en-US" dirty="0" smtClean="0"/>
+              <a:t>) as </a:t>
+            </a:r>
+            <a:r>
+              <a:rPr lang="en-US" dirty="0"/>
+              <a:t>output.</a:t>
             </a:r>
           </a:p>
         </p:txBody>
@@ -4458,7 +4630,7 @@
         <p:spPr/>
         <p:txBody>
           <a:bodyPr>
-            <a:normAutofit/>
+            <a:normAutofit fontScale="92500" lnSpcReduction="20000"/>
           </a:bodyPr>
           <a:lstStyle/>
           <a:p>
@@ -4482,13 +4654,25 @@
             </a:r>
             <a:r>
               <a:rPr lang="en-US" dirty="0" smtClean="0"/>
-              <a:t>, to create multidimensional arrays</a:t>
-            </a:r>
-          </a:p>
-          <a:p>
-            <a:r>
-              <a:rPr lang="en-US" dirty="0"/>
-              <a:t>When fewer indices are provided than the number of axes, the missing indices are considered complete slices</a:t>
+              <a:t>, to create multidimensional </a:t>
+            </a:r>
+            <a:r>
+              <a:rPr lang="en-US" dirty="0" smtClean="0"/>
+              <a:t>arrays, with values obtained through a function</a:t>
+            </a:r>
+            <a:endParaRPr lang="en-US" dirty="0" smtClean="0"/>
+          </a:p>
+          <a:p>
+            <a:endParaRPr lang="en-US" dirty="0" smtClean="0"/>
+          </a:p>
+          <a:p>
+            <a:r>
+              <a:rPr lang="en-US" dirty="0" smtClean="0"/>
+              <a:t>When </a:t>
+            </a:r>
+            <a:r>
+              <a:rPr lang="en-US" dirty="0"/>
+              <a:t>fewer indices are provided than the number of axes, the missing indices are considered complete slices</a:t>
             </a:r>
             <a:r>
               <a:rPr lang="en-US" dirty="0" smtClean="0"/>

</xml_diff>

<commit_message>
Post lezione 5/5 - Anno 1
</commit_message>
<xml_diff>
--- a/Numpy.pptx
+++ b/Numpy.pptx
@@ -253,7 +253,7 @@
           <a:p>
             <a:fld id="{63A1C593-65D0-4073-BCC9-577B9352EA97}" type="datetimeFigureOut">
               <a:rPr lang="en-US" smtClean="0"/>
-              <a:t>5/4/2020</a:t>
+              <a:t>5/5/2020</a:t>
             </a:fld>
             <a:endParaRPr lang="en-US"/>
           </a:p>
@@ -423,7 +423,7 @@
           <a:p>
             <a:fld id="{63A1C593-65D0-4073-BCC9-577B9352EA97}" type="datetimeFigureOut">
               <a:rPr lang="en-US" smtClean="0"/>
-              <a:t>5/4/2020</a:t>
+              <a:t>5/5/2020</a:t>
             </a:fld>
             <a:endParaRPr lang="en-US"/>
           </a:p>
@@ -603,7 +603,7 @@
           <a:p>
             <a:fld id="{63A1C593-65D0-4073-BCC9-577B9352EA97}" type="datetimeFigureOut">
               <a:rPr lang="en-US" smtClean="0"/>
-              <a:t>5/4/2020</a:t>
+              <a:t>5/5/2020</a:t>
             </a:fld>
             <a:endParaRPr lang="en-US"/>
           </a:p>
@@ -773,7 +773,7 @@
           <a:p>
             <a:fld id="{63A1C593-65D0-4073-BCC9-577B9352EA97}" type="datetimeFigureOut">
               <a:rPr lang="en-US" smtClean="0"/>
-              <a:t>5/4/2020</a:t>
+              <a:t>5/5/2020</a:t>
             </a:fld>
             <a:endParaRPr lang="en-US"/>
           </a:p>
@@ -1019,7 +1019,7 @@
           <a:p>
             <a:fld id="{63A1C593-65D0-4073-BCC9-577B9352EA97}" type="datetimeFigureOut">
               <a:rPr lang="en-US" smtClean="0"/>
-              <a:t>5/4/2020</a:t>
+              <a:t>5/5/2020</a:t>
             </a:fld>
             <a:endParaRPr lang="en-US"/>
           </a:p>
@@ -1251,7 +1251,7 @@
           <a:p>
             <a:fld id="{63A1C593-65D0-4073-BCC9-577B9352EA97}" type="datetimeFigureOut">
               <a:rPr lang="en-US" smtClean="0"/>
-              <a:t>5/4/2020</a:t>
+              <a:t>5/5/2020</a:t>
             </a:fld>
             <a:endParaRPr lang="en-US"/>
           </a:p>
@@ -1618,7 +1618,7 @@
           <a:p>
             <a:fld id="{63A1C593-65D0-4073-BCC9-577B9352EA97}" type="datetimeFigureOut">
               <a:rPr lang="en-US" smtClean="0"/>
-              <a:t>5/4/2020</a:t>
+              <a:t>5/5/2020</a:t>
             </a:fld>
             <a:endParaRPr lang="en-US"/>
           </a:p>
@@ -1736,7 +1736,7 @@
           <a:p>
             <a:fld id="{63A1C593-65D0-4073-BCC9-577B9352EA97}" type="datetimeFigureOut">
               <a:rPr lang="en-US" smtClean="0"/>
-              <a:t>5/4/2020</a:t>
+              <a:t>5/5/2020</a:t>
             </a:fld>
             <a:endParaRPr lang="en-US"/>
           </a:p>
@@ -1831,7 +1831,7 @@
           <a:p>
             <a:fld id="{63A1C593-65D0-4073-BCC9-577B9352EA97}" type="datetimeFigureOut">
               <a:rPr lang="en-US" smtClean="0"/>
-              <a:t>5/4/2020</a:t>
+              <a:t>5/5/2020</a:t>
             </a:fld>
             <a:endParaRPr lang="en-US"/>
           </a:p>
@@ -2108,7 +2108,7 @@
           <a:p>
             <a:fld id="{63A1C593-65D0-4073-BCC9-577B9352EA97}" type="datetimeFigureOut">
               <a:rPr lang="en-US" smtClean="0"/>
-              <a:t>5/4/2020</a:t>
+              <a:t>5/5/2020</a:t>
             </a:fld>
             <a:endParaRPr lang="en-US"/>
           </a:p>
@@ -2361,7 +2361,7 @@
           <a:p>
             <a:fld id="{63A1C593-65D0-4073-BCC9-577B9352EA97}" type="datetimeFigureOut">
               <a:rPr lang="en-US" smtClean="0"/>
-              <a:t>5/4/2020</a:t>
+              <a:t>5/5/2020</a:t>
             </a:fld>
             <a:endParaRPr lang="en-US"/>
           </a:p>
@@ -2574,7 +2574,7 @@
           <a:p>
             <a:fld id="{63A1C593-65D0-4073-BCC9-577B9352EA97}" type="datetimeFigureOut">
               <a:rPr lang="en-US" smtClean="0"/>
-              <a:t>5/4/2020</a:t>
+              <a:t>5/5/2020</a:t>
             </a:fld>
             <a:endParaRPr lang="en-US"/>
           </a:p>
@@ -3183,11 +3183,7 @@
             </a:r>
             <a:r>
               <a:rPr lang="en-US" dirty="0" smtClean="0"/>
-              <a:t>(missing) </a:t>
-            </a:r>
-            <a:r>
-              <a:rPr lang="en-US" dirty="0" smtClean="0"/>
-              <a:t>dimension(s) </a:t>
+              <a:t>(missing) dimension(s) </a:t>
             </a:r>
             <a:r>
               <a:rPr lang="en-US" dirty="0"/>
@@ -3230,12 +3226,16 @@
               <a:t>function </a:t>
             </a:r>
             <a:r>
-              <a:rPr lang="en-US" dirty="0" err="1"/>
+              <a:rPr lang="en-US" dirty="0" err="1" smtClean="0"/>
               <a:t>column_stack</a:t>
             </a:r>
             <a:r>
-              <a:rPr lang="en-US" dirty="0"/>
-              <a:t> stacks 1D arrays as columns into a 2D array. It is equivalent to </a:t>
+              <a:rPr lang="en-US" dirty="0" smtClean="0"/>
+              <a:t>() </a:t>
+            </a:r>
+            <a:r>
+              <a:rPr lang="en-US" dirty="0"/>
+              <a:t>stacks 1D arrays as columns into a 2D array. It is equivalent to </a:t>
             </a:r>
             <a:r>
               <a:rPr lang="en-US" dirty="0" err="1"/>
@@ -3325,28 +3325,19 @@
           <a:p>
             <a:r>
               <a:rPr lang="en-US" dirty="0"/>
-              <a:t>Simple assignments make no copy of objects or </a:t>
-            </a:r>
-            <a:r>
-              <a:rPr lang="en-US"/>
-              <a:t>their </a:t>
-            </a:r>
-            <a:r>
-              <a:rPr lang="en-US" smtClean="0"/>
+              <a:t>Simple assignments make no copy of objects or their </a:t>
+            </a:r>
+            <a:r>
+              <a:rPr lang="en-US" dirty="0" smtClean="0"/>
               <a:t>data</a:t>
             </a:r>
           </a:p>
           <a:p>
             <a:pPr lvl="1"/>
             <a:r>
-              <a:rPr lang="en-US" smtClean="0"/>
-              <a:t>(i.e</a:t>
-            </a:r>
-            <a:r>
               <a:rPr lang="en-US" dirty="0" smtClean="0"/>
-              <a:t>. the underlying object is the same).</a:t>
-            </a:r>
-            <a:endParaRPr lang="en-US" dirty="0" smtClean="0"/>
+              <a:t>(i.e. the underlying object is the same).</a:t>
+            </a:r>
           </a:p>
           <a:p>
             <a:r>
@@ -3368,7 +3359,15 @@
             <a:pPr lvl="1"/>
             <a:r>
               <a:rPr lang="en-US" dirty="0"/>
-              <a:t>Different array objects can share the same data. The view method creates a new array object that looks at the same data</a:t>
+              <a:t>Different array objects can share the same data. The </a:t>
+            </a:r>
+            <a:r>
+              <a:rPr lang="en-US" dirty="0" smtClean="0"/>
+              <a:t>view() </a:t>
+            </a:r>
+            <a:r>
+              <a:rPr lang="en-US" dirty="0"/>
+              <a:t>method creates a new array object that looks at the same data</a:t>
             </a:r>
             <a:r>
               <a:rPr lang="en-US" dirty="0" smtClean="0"/>
@@ -3397,7 +3396,15 @@
           <a:p>
             <a:r>
               <a:rPr lang="en-US" dirty="0"/>
-              <a:t>The copy method makes a complete copy of the array and its data</a:t>
+              <a:t>The </a:t>
+            </a:r>
+            <a:r>
+              <a:rPr lang="en-US" dirty="0" smtClean="0"/>
+              <a:t>copy() </a:t>
+            </a:r>
+            <a:r>
+              <a:rPr lang="en-US" dirty="0"/>
+              <a:t>method makes a complete copy of the array and its data</a:t>
             </a:r>
             <a:r>
               <a:rPr lang="en-US" dirty="0" smtClean="0"/>
@@ -3491,8 +3498,12 @@
               <a:t> main object is the </a:t>
             </a:r>
             <a:r>
+              <a:rPr lang="en-US" b="1" dirty="0" smtClean="0"/>
+              <a:t>homogeneous</a:t>
+            </a:r>
+            <a:r>
               <a:rPr lang="en-US" dirty="0" smtClean="0"/>
-              <a:t>homogeneous </a:t>
+              <a:t> </a:t>
             </a:r>
             <a:r>
               <a:rPr lang="en-US" b="1" dirty="0" smtClean="0"/>
@@ -3540,38 +3551,42 @@
                   <a:srgbClr val="FF0000"/>
                 </a:solidFill>
               </a:rPr>
-              <a:t>axes (or dimensions)</a:t>
+              <a:t>axes.</a:t>
+            </a:r>
+            <a:endParaRPr lang="en-US" dirty="0" smtClean="0"/>
+          </a:p>
+          <a:p>
+            <a:r>
+              <a:rPr lang="en-US" dirty="0"/>
+              <a:t>For example, </a:t>
+            </a:r>
+            <a:r>
+              <a:rPr lang="en-US" b="1" dirty="0"/>
+              <a:t>the coordinates of a point in 3D space [1, 2, 1] has one axis</a:t>
+            </a:r>
+            <a:r>
+              <a:rPr lang="en-US" dirty="0"/>
+              <a:t>. That axis has </a:t>
+            </a:r>
+            <a:r>
+              <a:rPr lang="en-US" b="1" dirty="0"/>
+              <a:t>3 elements in it</a:t>
+            </a:r>
+            <a:r>
+              <a:rPr lang="en-US" dirty="0"/>
+              <a:t>, so we say it has a </a:t>
+            </a:r>
+            <a:r>
+              <a:rPr lang="en-US" b="1" dirty="0"/>
+              <a:t>length of </a:t>
+            </a:r>
+            <a:r>
+              <a:rPr lang="en-US" b="1" dirty="0" smtClean="0"/>
+              <a:t>3</a:t>
             </a:r>
             <a:r>
               <a:rPr lang="en-US" dirty="0" smtClean="0"/>
               <a:t>.</a:t>
-            </a:r>
-            <a:endParaRPr lang="en-US" dirty="0" smtClean="0"/>
-          </a:p>
-          <a:p>
-            <a:r>
-              <a:rPr lang="en-US" dirty="0"/>
-              <a:t>For example, </a:t>
-            </a:r>
-            <a:r>
-              <a:rPr lang="en-US" b="1" dirty="0"/>
-              <a:t>the coordinates of a point in 3D space [1, 2, 1] has one axis</a:t>
-            </a:r>
-            <a:r>
-              <a:rPr lang="en-US" dirty="0"/>
-              <a:t>. That axis has </a:t>
-            </a:r>
-            <a:r>
-              <a:rPr lang="en-US" b="1" dirty="0"/>
-              <a:t>3 elements in it</a:t>
-            </a:r>
-            <a:r>
-              <a:rPr lang="en-US" dirty="0"/>
-              <a:t>, so we say it has a length of </a:t>
-            </a:r>
-            <a:r>
-              <a:rPr lang="en-US" dirty="0" smtClean="0"/>
-              <a:t>3.</a:t>
             </a:r>
           </a:p>
           <a:p>
@@ -3776,17 +3791,16 @@
             </a:r>
             <a:r>
               <a:rPr lang="en-US" dirty="0" smtClean="0"/>
-              <a:t> (number of axes/</a:t>
-            </a:r>
-            <a:r>
-              <a:rPr lang="en-US" dirty="0" err="1" smtClean="0"/>
-              <a:t>dmensions</a:t>
+              <a:t> (number of </a:t>
+            </a:r>
+            <a:r>
+              <a:rPr lang="en-US" dirty="0" smtClean="0"/>
+              <a:t>axes/dimensions</a:t>
             </a:r>
             <a:r>
               <a:rPr lang="en-US" dirty="0" smtClean="0"/>
               <a:t>)</a:t>
             </a:r>
-            <a:endParaRPr lang="en-US" dirty="0" smtClean="0"/>
           </a:p>
           <a:p>
             <a:pPr lvl="1"/>
@@ -3798,7 +3812,6 @@
               <a:rPr lang="en-US" dirty="0" smtClean="0"/>
               <a:t> (size of the array in each dimension/axis)</a:t>
             </a:r>
-            <a:endParaRPr lang="en-US" dirty="0" smtClean="0"/>
           </a:p>
           <a:p>
             <a:pPr lvl="1"/>
@@ -3816,7 +3829,11 @@
             </a:r>
             <a:r>
               <a:rPr lang="en-US" dirty="0" smtClean="0"/>
-              <a:t> (type of the elements)</a:t>
+              <a:t> (type of the </a:t>
+            </a:r>
+            <a:r>
+              <a:rPr lang="en-US" dirty="0" smtClean="0"/>
+              <a:t>elements - homogeneous)</a:t>
             </a:r>
             <a:endParaRPr lang="it-IT" dirty="0" smtClean="0"/>
           </a:p>
@@ -3824,27 +3841,18 @@
             <a:pPr lvl="1"/>
             <a:r>
               <a:rPr lang="it-IT" dirty="0" smtClean="0"/>
-              <a:t>Etc</a:t>
-            </a:r>
+              <a:t>Etc.</a:t>
+            </a:r>
+          </a:p>
+          <a:p>
             <a:r>
               <a:rPr lang="it-IT" dirty="0" smtClean="0"/>
-              <a:t>.</a:t>
-            </a:r>
-          </a:p>
-          <a:p>
-            <a:r>
-              <a:rPr lang="it-IT" dirty="0" smtClean="0"/>
-              <a:t>Array </a:t>
-            </a:r>
-            <a:r>
-              <a:rPr lang="it-IT" dirty="0" smtClean="0"/>
-              <a:t>creation, </a:t>
+              <a:t>Array creation, </a:t>
             </a:r>
             <a:r>
               <a:rPr lang="it-IT" i="1" dirty="0" smtClean="0"/>
               <a:t>np.arange(10)</a:t>
             </a:r>
-            <a:endParaRPr lang="it-IT" i="1" dirty="0" smtClean="0"/>
           </a:p>
           <a:p>
             <a:r>
@@ -3959,7 +3967,7 @@
               <a:t>When operating with arrays of different types, the type of the resulting array corresponds to the more general or precise one (a behavior known as </a:t>
             </a:r>
             <a:r>
-              <a:rPr lang="en-US" dirty="0" err="1"/>
+              <a:rPr lang="en-US" b="1" dirty="0" err="1"/>
               <a:t>upcasting</a:t>
             </a:r>
             <a:r>
@@ -4518,8 +4526,14 @@
               <a:t>ufunc</a:t>
             </a:r>
             <a:r>
-              <a:rPr lang="en-US" dirty="0"/>
-              <a:t>). Within </a:t>
+              <a:rPr lang="en-US" dirty="0" smtClean="0"/>
+              <a:t>).</a:t>
+            </a:r>
+          </a:p>
+          <a:p>
+            <a:r>
+              <a:rPr lang="en-US" dirty="0" smtClean="0"/>
+              <a:t>Within </a:t>
             </a:r>
             <a:r>
               <a:rPr lang="en-US" dirty="0" err="1"/>
@@ -4527,7 +4541,15 @@
             </a:r>
             <a:r>
               <a:rPr lang="en-US" dirty="0"/>
-              <a:t>, these functions operate elementwise on an </a:t>
+              <a:t>, these functions operate </a:t>
+            </a:r>
+            <a:r>
+              <a:rPr lang="en-US" b="1" dirty="0"/>
+              <a:t>elementwise</a:t>
+            </a:r>
+            <a:r>
+              <a:rPr lang="en-US" dirty="0"/>
+              <a:t> on an </a:t>
             </a:r>
             <a:r>
               <a:rPr lang="en-US" dirty="0" smtClean="0"/>
@@ -4654,13 +4676,8 @@
             </a:r>
             <a:r>
               <a:rPr lang="en-US" dirty="0" smtClean="0"/>
-              <a:t>, to create multidimensional </a:t>
-            </a:r>
-            <a:r>
-              <a:rPr lang="en-US" dirty="0" smtClean="0"/>
-              <a:t>arrays, with values obtained through a function</a:t>
-            </a:r>
-            <a:endParaRPr lang="en-US" dirty="0" smtClean="0"/>
+              <a:t>, to create multidimensional arrays, with values obtained through a function</a:t>
+            </a:r>
           </a:p>
           <a:p>
             <a:endParaRPr lang="en-US" dirty="0" smtClean="0"/>

</xml_diff>